<commit_message>
TOM 11 Was passt in einen Tag
Für Promotion überarbeitet
</commit_message>
<xml_diff>
--- a/training-cards/music moves/Tomatoes (TOM)/ger/apprentice/ger_TOM_11_Was_passt_in_einen_Tag_MM_A.pptx
+++ b/training-cards/music moves/Tomatoes (TOM)/ger/apprentice/ger_TOM_11_Was_passt_in_einen_Tag_MM_A.pptx
@@ -166,7 +166,7 @@
           </a:lstStyle>
           <a:p>
             <a:r>
-              <a:rPr lang="de-DE" smtClean="0"/>
+              <a:rPr lang="de-DE"/>
               <a:t>Mastertitelformat bearbeiten</a:t>
             </a:r>
             <a:endParaRPr lang="de-DE" dirty="0"/>
@@ -287,7 +287,7 @@
           </a:lstStyle>
           <a:p>
             <a:r>
-              <a:rPr lang="de-DE" smtClean="0"/>
+              <a:rPr lang="de-DE"/>
               <a:t>Master-Untertitelformat bearbeiten</a:t>
             </a:r>
             <a:endParaRPr lang="de-DE" dirty="0"/>
@@ -321,35 +321,35 @@
           <a:p>
             <a:pPr lvl="0"/>
             <a:r>
-              <a:rPr lang="de-DE" smtClean="0"/>
+              <a:rPr lang="de-DE"/>
               <a:t>Mastertextformat bearbeiten</a:t>
             </a:r>
           </a:p>
           <a:p>
             <a:pPr lvl="1"/>
             <a:r>
-              <a:rPr lang="de-DE" smtClean="0"/>
+              <a:rPr lang="de-DE"/>
               <a:t>Zweite Ebene</a:t>
             </a:r>
           </a:p>
           <a:p>
             <a:pPr lvl="2"/>
             <a:r>
-              <a:rPr lang="de-DE" smtClean="0"/>
+              <a:rPr lang="de-DE"/>
               <a:t>Dritte Ebene</a:t>
             </a:r>
           </a:p>
           <a:p>
             <a:pPr lvl="3"/>
             <a:r>
-              <a:rPr lang="de-DE" smtClean="0"/>
+              <a:rPr lang="de-DE"/>
               <a:t>Vierte Ebene</a:t>
             </a:r>
           </a:p>
           <a:p>
             <a:pPr lvl="4"/>
             <a:r>
-              <a:rPr lang="de-DE" smtClean="0"/>
+              <a:rPr lang="de-DE"/>
               <a:t>Fünfte Ebene</a:t>
             </a:r>
             <a:endParaRPr lang="de-DE" dirty="0"/>
@@ -397,7 +397,7 @@
           <a:p>
             <a:pPr algn="l"/>
             <a:r>
-              <a:rPr lang="de-DE" sz="1000" dirty="0" smtClean="0">
+              <a:rPr lang="de-DE" sz="1000" dirty="0">
                 <a:solidFill>
                   <a:srgbClr val="5D5E5F"/>
                 </a:solidFill>
@@ -407,7 +407,7 @@
               <a:t>REGINA</a:t>
             </a:r>
             <a:r>
-              <a:rPr lang="de-DE" sz="1000" baseline="0" dirty="0" smtClean="0">
+              <a:rPr lang="de-DE" sz="1000" baseline="0" dirty="0">
                 <a:solidFill>
                   <a:srgbClr val="5D5E5F"/>
                 </a:solidFill>
@@ -417,7 +417,7 @@
               <a:t> BRANDHUBER</a:t>
             </a:r>
             <a:r>
-              <a:rPr lang="de-DE" sz="1000" dirty="0" smtClean="0">
+              <a:rPr lang="de-DE" sz="1000" dirty="0">
                 <a:solidFill>
                   <a:srgbClr val="5D5E5F"/>
                 </a:solidFill>
@@ -426,13 +426,6 @@
               </a:rPr>
               <a:t> </a:t>
             </a:r>
-            <a:endParaRPr lang="de-DE" sz="1000" dirty="0">
-              <a:solidFill>
-                <a:srgbClr val="5D5E5F"/>
-              </a:solidFill>
-              <a:latin typeface="Avenir Book"/>
-              <a:cs typeface="Avenir Book"/>
-            </a:endParaRPr>
           </a:p>
         </p:txBody>
       </p:sp>
@@ -545,35 +538,35 @@
           <a:p>
             <a:pPr lvl="0"/>
             <a:r>
-              <a:rPr lang="de-DE" smtClean="0"/>
+              <a:rPr lang="de-DE"/>
               <a:t>Mastertextformat bearbeiten</a:t>
             </a:r>
           </a:p>
           <a:p>
             <a:pPr lvl="1"/>
             <a:r>
-              <a:rPr lang="de-DE" smtClean="0"/>
+              <a:rPr lang="de-DE"/>
               <a:t>Zweite Ebene</a:t>
             </a:r>
           </a:p>
           <a:p>
             <a:pPr lvl="2"/>
             <a:r>
-              <a:rPr lang="de-DE" smtClean="0"/>
+              <a:rPr lang="de-DE"/>
               <a:t>Dritte Ebene</a:t>
             </a:r>
           </a:p>
           <a:p>
             <a:pPr lvl="3"/>
             <a:r>
-              <a:rPr lang="de-DE" smtClean="0"/>
+              <a:rPr lang="de-DE"/>
               <a:t>Vierte Ebene</a:t>
             </a:r>
           </a:p>
           <a:p>
             <a:pPr lvl="4"/>
             <a:r>
-              <a:rPr lang="de-DE" smtClean="0"/>
+              <a:rPr lang="de-DE"/>
               <a:t>Fünfte Ebene</a:t>
             </a:r>
             <a:endParaRPr lang="de-DE" dirty="0"/>
@@ -603,7 +596,7 @@
           <a:lstStyle/>
           <a:p>
             <a:r>
-              <a:rPr lang="de-DE" sz="2400" dirty="0" smtClean="0">
+              <a:rPr lang="de-DE" sz="2400" dirty="0">
                 <a:solidFill>
                   <a:srgbClr val="7E006B"/>
                 </a:solidFill>
@@ -613,7 +606,7 @@
               <a:t>TR	AININGS</a:t>
             </a:r>
             <a:r>
-              <a:rPr lang="de-DE" sz="2400" dirty="0" smtClean="0">
+              <a:rPr lang="de-DE" sz="2400" dirty="0">
                 <a:solidFill>
                   <a:srgbClr val="7E006B"/>
                 </a:solidFill>
@@ -708,10 +701,9 @@
           <a:lstStyle/>
           <a:p>
             <a:r>
-              <a:rPr lang="de-DE" smtClean="0"/>
+              <a:rPr lang="de-DE"/>
               <a:t>Mastertitelformat bearbeiten</a:t>
             </a:r>
-            <a:endParaRPr lang="de-DE"/>
           </a:p>
         </p:txBody>
       </p:sp>
@@ -732,7 +724,7 @@
           <a:p>
             <a:fld id="{FF5B2BAF-DF38-0A48-A798-0C06E514FD52}" type="datetimeFigureOut">
               <a:rPr lang="de-DE" smtClean="0"/>
-              <a:t>25.01.16</a:t>
+              <a:t>28.09.18</a:t>
             </a:fld>
             <a:endParaRPr lang="de-DE" dirty="0"/>
           </a:p>
@@ -843,10 +835,9 @@
           <a:p>
             <a:pPr marL="0" lvl="0" algn="l"/>
             <a:r>
-              <a:rPr lang="de-DE" dirty="0" smtClean="0"/>
+              <a:rPr lang="de-DE" dirty="0"/>
               <a:t>Überschrift bearbeiten </a:t>
             </a:r>
-            <a:endParaRPr lang="de-DE" dirty="0"/>
           </a:p>
         </p:txBody>
       </p:sp>
@@ -877,38 +868,37 @@
           <a:p>
             <a:pPr lvl="0"/>
             <a:r>
-              <a:rPr lang="de-DE" dirty="0" smtClean="0"/>
+              <a:rPr lang="de-DE" dirty="0"/>
               <a:t>Mastertextformat bearbeiten</a:t>
             </a:r>
           </a:p>
           <a:p>
             <a:pPr lvl="1"/>
             <a:r>
-              <a:rPr lang="de-DE" dirty="0" smtClean="0"/>
+              <a:rPr lang="de-DE" dirty="0"/>
               <a:t>Zweite Ebene</a:t>
             </a:r>
           </a:p>
           <a:p>
             <a:pPr lvl="2"/>
             <a:r>
-              <a:rPr lang="de-DE" dirty="0" smtClean="0"/>
+              <a:rPr lang="de-DE" dirty="0"/>
               <a:t>Dritte Ebene</a:t>
             </a:r>
           </a:p>
           <a:p>
             <a:pPr lvl="3"/>
             <a:r>
-              <a:rPr lang="de-DE" dirty="0" smtClean="0"/>
+              <a:rPr lang="de-DE" dirty="0"/>
               <a:t>Vierte Ebene</a:t>
             </a:r>
           </a:p>
           <a:p>
             <a:pPr lvl="4"/>
             <a:r>
-              <a:rPr lang="de-DE" dirty="0" smtClean="0"/>
+              <a:rPr lang="de-DE" dirty="0"/>
               <a:t>Fünfte Ebene</a:t>
             </a:r>
-            <a:endParaRPr lang="de-DE" dirty="0"/>
           </a:p>
         </p:txBody>
       </p:sp>
@@ -947,7 +937,7 @@
           <a:p>
             <a:fld id="{FF5B2BAF-DF38-0A48-A798-0C06E514FD52}" type="datetimeFigureOut">
               <a:rPr lang="de-DE" smtClean="0"/>
-              <a:t>25.01.16</a:t>
+              <a:t>28.09.18</a:t>
             </a:fld>
             <a:endParaRPr lang="de-DE" dirty="0"/>
           </a:p>
@@ -1181,7 +1171,7 @@
           <a:lstStyle/>
           <a:p>
             <a:r>
-              <a:rPr lang="de-DE" sz="1050" b="1" dirty="0" smtClean="0">
+              <a:rPr lang="de-DE" sz="1050" b="1" dirty="0">
                 <a:solidFill>
                   <a:schemeClr val="bg1"/>
                 </a:solidFill>
@@ -1191,7 +1181,7 @@
               <a:t>TRAININGSKARTE</a:t>
             </a:r>
             <a:r>
-              <a:rPr lang="de-DE" sz="1050" dirty="0" smtClean="0">
+              <a:rPr lang="de-DE" sz="1050" dirty="0">
                 <a:solidFill>
                   <a:schemeClr val="bg1"/>
                 </a:solidFill>
@@ -1201,7 +1191,7 @@
               <a:t> </a:t>
             </a:r>
             <a:r>
-              <a:rPr lang="de-DE" sz="1050" b="1" dirty="0" smtClean="0">
+              <a:rPr lang="de-DE" sz="1050" b="1" dirty="0">
                 <a:solidFill>
                   <a:schemeClr val="bg1"/>
                 </a:solidFill>
@@ -1210,13 +1200,6 @@
               </a:rPr>
               <a:t>TOM 11</a:t>
             </a:r>
-            <a:endParaRPr lang="de-DE" sz="1050" b="1" dirty="0">
-              <a:solidFill>
-                <a:schemeClr val="bg1"/>
-              </a:solidFill>
-              <a:latin typeface="Avenir Heavy"/>
-              <a:cs typeface="Avenir Heavy"/>
-            </a:endParaRPr>
           </a:p>
         </p:txBody>
       </p:sp>
@@ -1599,20 +1582,16 @@
           <a:lstStyle/>
           <a:p>
             <a:r>
-              <a:rPr lang="de-DE" dirty="0" smtClean="0"/>
+              <a:rPr lang="de-DE" dirty="0"/>
               <a:t>WAS PASST </a:t>
             </a:r>
             <a:r>
-              <a:rPr lang="de-DE" dirty="0" smtClean="0">
+              <a:rPr lang="de-DE" dirty="0">
                 <a:latin typeface="Avenir Book"/>
                 <a:cs typeface="Avenir Book"/>
               </a:rPr>
               <a:t>IN EINEN TAG?</a:t>
             </a:r>
-            <a:endParaRPr lang="de-DE" dirty="0">
-              <a:latin typeface="Avenir Book"/>
-              <a:cs typeface="Avenir Book"/>
-            </a:endParaRPr>
           </a:p>
         </p:txBody>
       </p:sp>
@@ -1632,54 +1611,38 @@
           <a:lstStyle/>
           <a:p>
             <a:r>
-              <a:rPr lang="de-DE" sz="1100" dirty="0" smtClean="0"/>
-              <a:t>Als Musiker laufen wir oft mit einer </a:t>
-            </a:r>
-            <a:r>
-              <a:rPr lang="de-DE" sz="1100" dirty="0" err="1" smtClean="0"/>
-              <a:t>Übekrankheit</a:t>
-            </a:r>
-            <a:r>
-              <a:rPr lang="de-DE" sz="1100" dirty="0" smtClean="0"/>
-              <a:t> umher: Wie lange habe ich geübt? War das genug? Wie viel üben denn die anderen? Oh Gott das ist ja viel mehr!</a:t>
-            </a:r>
-          </a:p>
-          <a:p>
-            <a:r>
-              <a:rPr lang="de-DE" sz="1100" dirty="0" smtClean="0"/>
+              <a:rPr lang="de-DE" sz="1100" dirty="0"/>
+              <a:t>Als Musikerinnen und Musiker laufen wir oft mit einer Übe-Krankheit umher: Wie lange habe ich geübt? War das genug? Wie viel üben denn die anderen? Oh Gott das ist ja viel mehr!</a:t>
+            </a:r>
+          </a:p>
+          <a:p>
+            <a:r>
+              <a:rPr lang="de-DE" sz="1100" dirty="0"/>
               <a:t>Oft überschätzen wir die Kapazität, die an einem Tag sinnvoll gestemmt werden kann und laufen dann mit einem entsprechenden Mangelgefühl im Bauch herum, nicht genug getan zu haben.</a:t>
             </a:r>
           </a:p>
           <a:p>
             <a:r>
-              <a:rPr lang="de-DE" sz="1100" dirty="0" smtClean="0"/>
-              <a:t>Wenn Du beginnst zu dokumentieren, was in Deinen </a:t>
-            </a:r>
-            <a:r>
               <a:rPr lang="de-DE" sz="1100" dirty="0"/>
-              <a:t>T</a:t>
-            </a:r>
-            <a:r>
-              <a:rPr lang="de-DE" sz="1100" dirty="0" smtClean="0"/>
-              <a:t>ag passt, kann Du diese Krankheit heilen und bekommst eine Wahrnehmung, was Deine tatsächliche Tageskapazität ist</a:t>
-            </a:r>
-          </a:p>
-          <a:p>
-            <a:r>
-              <a:rPr lang="de-DE" sz="1100" dirty="0" smtClean="0"/>
+              <a:t>Wenn Du beginnst zu dokumentieren, was in Deinen Tag passt, kann Du diese Krankheit heilen und bekommst eine Wahrnehmung, was Deine tatsächliche Tageskapazität ist</a:t>
+            </a:r>
+          </a:p>
+          <a:p>
+            <a:r>
+              <a:rPr lang="de-DE" sz="1100" dirty="0"/>
               <a:t>Dabei geht es nicht darum möglichst viel in einen Tag zu packen, sondern bequem vor dich hinzuwerkeln oder zu üben. Wenn du also viele Tagesdokumentationen hintereinander machst, solltest Du keine Ermüdungserscheinungen bekommen.</a:t>
             </a:r>
           </a:p>
           <a:p>
             <a:r>
-              <a:rPr lang="de-DE" sz="1100" dirty="0" smtClean="0"/>
+              <a:rPr lang="de-DE" sz="1100" dirty="0"/>
               <a:t>Sinnvoll wäre auch, während Deinem Tagwerk immer wieder Tomaten zu machen (siehe TOM 08), um auch ein Gefühl dafür zu bekommen wie viele Tomaten in Deinen Tag passen.</a:t>
             </a:r>
           </a:p>
           <a:p>
             <a:r>
-              <a:rPr lang="de-DE" sz="1100" dirty="0" smtClean="0"/>
-              <a:t>Termine und andere Betätigungen kannst Du natürlich auch in Deine Tagesdokumentation aufnehmen.</a:t>
+              <a:rPr lang="de-DE" sz="1100" dirty="0"/>
+              <a:t>Termine und andere Betätigungen kannst Du natürlich auch in Deine Tagesdokumentation mit aufnehmen.</a:t>
             </a:r>
           </a:p>
           <a:p>
@@ -1733,63 +1696,25 @@
           <a:lstStyle/>
           <a:p>
             <a:r>
-              <a:rPr lang="de-DE" dirty="0" smtClean="0"/>
-              <a:t>Dokumentiere Deine Tagesaktivitäten innerhalb von 2 Wochen an </a:t>
-            </a:r>
-            <a:r>
-              <a:rPr lang="de-DE" dirty="0" smtClean="0"/>
-              <a:t>4 </a:t>
-            </a:r>
-            <a:r>
-              <a:rPr lang="de-DE" dirty="0" smtClean="0"/>
-              <a:t>verschiedenen Tagen.</a:t>
-            </a:r>
-          </a:p>
-          <a:p>
-            <a:r>
-              <a:rPr lang="de-DE" dirty="0" smtClean="0"/>
-              <a:t>Dokumentiere </a:t>
-            </a:r>
-            <a:r>
-              <a:rPr lang="de-DE" dirty="0" smtClean="0"/>
-              <a:t>alles, was Du aktiv tust oder Du als Training bezeichnen würdest. </a:t>
-            </a:r>
-            <a:r>
-              <a:rPr lang="de-DE" dirty="0" smtClean="0"/>
-              <a:t>Wenn Du </a:t>
-            </a:r>
-            <a:r>
               <a:rPr lang="de-DE" dirty="0"/>
-              <a:t>T</a:t>
-            </a:r>
-            <a:r>
-              <a:rPr lang="de-DE" dirty="0" smtClean="0"/>
-              <a:t>omaten machst, dann </a:t>
-            </a:r>
-            <a:r>
-              <a:rPr lang="de-DE" dirty="0" smtClean="0"/>
-              <a:t>kannst Du sie dementsprechend kennzeichnen.</a:t>
-            </a:r>
-            <a:endParaRPr lang="de-DE" dirty="0" smtClean="0"/>
-          </a:p>
-          <a:p>
-            <a:r>
-              <a:rPr lang="de-DE" smtClean="0"/>
+              <a:t>Dokumentiere Deine Tagesaktivitäten innerhalb von 2 Wochen an 4 verschiedenen Tagen.</a:t>
+            </a:r>
+          </a:p>
+          <a:p>
+            <a:r>
+              <a:rPr lang="de-DE" dirty="0"/>
+              <a:t>Dokumentiere alles, was Du aktiv tust oder Du als Training bezeichnen würdest. Wenn Du Tomaten machst, dann kannst Du sie dementsprechend kennzeichnen.</a:t>
+            </a:r>
+          </a:p>
+          <a:p>
+            <a:r>
+              <a:rPr lang="de-DE"/>
               <a:t>Zeige </a:t>
             </a:r>
             <a:r>
-              <a:rPr lang="de-DE" dirty="0" smtClean="0"/>
-              <a:t>Deine Dokumentation </a:t>
-            </a:r>
-            <a:r>
               <a:rPr lang="de-DE" dirty="0"/>
-              <a:t>Deinem </a:t>
-            </a:r>
-            <a:r>
-              <a:rPr lang="de-DE" dirty="0" smtClean="0"/>
-              <a:t>Team.</a:t>
-            </a:r>
-            <a:endParaRPr lang="de-DE" dirty="0"/>
+              <a:t>Deine Dokumentation Deinem Team.</a:t>
+            </a:r>
           </a:p>
         </p:txBody>
       </p:sp>

</xml_diff>